<commit_message>
new file:   plot_notebooks/est_cap.png 	new file:   plot_notebooks/est_cap_sick.png 	modified:   plot_notebooks/pearc19.pptx 	modified:   slides/main.nav 	modified:   slides/main.pdf 	modified:   slides/main.tex
</commit_message>
<xml_diff>
--- a/plot_notebooks/pearc19.pptx
+++ b/plot_notebooks/pearc19.pptx
@@ -7,6 +7,7 @@
   <p:sldIdLst>
     <p:sldId id="256" r:id="rId2"/>
     <p:sldId id="257" r:id="rId3"/>
+    <p:sldId id="258" r:id="rId4"/>
   </p:sldIdLst>
   <p:sldSz cx="12192000" cy="6858000"/>
   <p:notesSz cx="6858000" cy="9144000"/>
@@ -3429,10 +3430,184 @@
           <a:chExt cx="0" cy="0"/>
         </a:xfrm>
       </p:grpSpPr>
+      <p:pic>
+        <p:nvPicPr>
+          <p:cNvPr id="3" name="Picture 2" descr="A close up of a map&#10;&#10;Description automatically generated">
+            <a:extLst>
+              <a:ext uri="{FF2B5EF4-FFF2-40B4-BE49-F238E27FC236}">
+                <a16:creationId xmlns:a16="http://schemas.microsoft.com/office/drawing/2014/main" id="{19216739-82F1-4546-A93E-2C7B311A980B}"/>
+              </a:ext>
+            </a:extLst>
+          </p:cNvPr>
+          <p:cNvPicPr>
+            <a:picLocks noChangeAspect="1"/>
+          </p:cNvPicPr>
+          <p:nvPr/>
+        </p:nvPicPr>
+        <p:blipFill>
+          <a:blip r:embed="rId2">
+            <a:extLst>
+              <a:ext uri="{28A0092B-C50C-407E-A947-70E740481C1C}">
+                <a14:useLocalDpi xmlns:a14="http://schemas.microsoft.com/office/drawing/2010/main" val="0"/>
+              </a:ext>
+            </a:extLst>
+          </a:blip>
+          <a:stretch>
+            <a:fillRect/>
+          </a:stretch>
+        </p:blipFill>
+        <p:spPr>
+          <a:xfrm>
+            <a:off x="978816" y="1600101"/>
+            <a:ext cx="5486690" cy="3657793"/>
+          </a:xfrm>
+          <a:prstGeom prst="rect">
+            <a:avLst/>
+          </a:prstGeom>
+        </p:spPr>
+      </p:pic>
+      <p:pic>
+        <p:nvPicPr>
+          <p:cNvPr id="5" name="Picture 4" descr="A close up of a logo&#10;&#10;Description automatically generated">
+            <a:extLst>
+              <a:ext uri="{FF2B5EF4-FFF2-40B4-BE49-F238E27FC236}">
+                <a16:creationId xmlns:a16="http://schemas.microsoft.com/office/drawing/2014/main" id="{85DAF9D4-B40F-4FED-BBEC-95251BA16168}"/>
+              </a:ext>
+            </a:extLst>
+          </p:cNvPr>
+          <p:cNvPicPr>
+            <a:picLocks noChangeAspect="1"/>
+          </p:cNvPicPr>
+          <p:nvPr/>
+        </p:nvPicPr>
+        <p:blipFill>
+          <a:blip r:embed="rId3">
+            <a:extLst>
+              <a:ext uri="{28A0092B-C50C-407E-A947-70E740481C1C}">
+                <a14:useLocalDpi xmlns:a14="http://schemas.microsoft.com/office/drawing/2010/main" val="0"/>
+              </a:ext>
+            </a:extLst>
+          </a:blip>
+          <a:stretch>
+            <a:fillRect/>
+          </a:stretch>
+        </p:blipFill>
+        <p:spPr>
+          <a:xfrm>
+            <a:off x="6096000" y="1600100"/>
+            <a:ext cx="5486690" cy="3657793"/>
+          </a:xfrm>
+          <a:prstGeom prst="rect">
+            <a:avLst/>
+          </a:prstGeom>
+        </p:spPr>
+      </p:pic>
     </p:spTree>
     <p:extLst>
       <p:ext uri="{BB962C8B-B14F-4D97-AF65-F5344CB8AC3E}">
         <p14:creationId xmlns:p14="http://schemas.microsoft.com/office/powerpoint/2010/main" val="4007844256"/>
+      </p:ext>
+    </p:extLst>
+  </p:cSld>
+  <p:clrMapOvr>
+    <a:masterClrMapping/>
+  </p:clrMapOvr>
+</p:sld>
+</file>
+
+<file path=ppt/slides/slide3.xml><?xml version="1.0" encoding="utf-8"?>
+<p:sld xmlns:a="http://schemas.openxmlformats.org/drawingml/2006/main" xmlns:r="http://schemas.openxmlformats.org/officeDocument/2006/relationships" xmlns:p="http://schemas.openxmlformats.org/presentationml/2006/main">
+  <p:cSld>
+    <p:spTree>
+      <p:nvGrpSpPr>
+        <p:cNvPr id="1" name=""/>
+        <p:cNvGrpSpPr/>
+        <p:nvPr/>
+      </p:nvGrpSpPr>
+      <p:grpSpPr>
+        <a:xfrm>
+          <a:off x="0" y="0"/>
+          <a:ext cx="0" cy="0"/>
+          <a:chOff x="0" y="0"/>
+          <a:chExt cx="0" cy="0"/>
+        </a:xfrm>
+      </p:grpSpPr>
+      <p:pic>
+        <p:nvPicPr>
+          <p:cNvPr id="5" name="Picture 4" descr="A close up of a map&#10;&#10;Description automatically generated">
+            <a:extLst>
+              <a:ext uri="{FF2B5EF4-FFF2-40B4-BE49-F238E27FC236}">
+                <a16:creationId xmlns:a16="http://schemas.microsoft.com/office/drawing/2014/main" id="{FF966559-CE08-4465-B748-6BD9FD89DFF3}"/>
+              </a:ext>
+            </a:extLst>
+          </p:cNvPr>
+          <p:cNvPicPr>
+            <a:picLocks noChangeAspect="1"/>
+          </p:cNvPicPr>
+          <p:nvPr/>
+        </p:nvPicPr>
+        <p:blipFill>
+          <a:blip r:embed="rId2">
+            <a:extLst>
+              <a:ext uri="{28A0092B-C50C-407E-A947-70E740481C1C}">
+                <a14:useLocalDpi xmlns:a14="http://schemas.microsoft.com/office/drawing/2010/main" val="0"/>
+              </a:ext>
+            </a:extLst>
+          </a:blip>
+          <a:stretch>
+            <a:fillRect/>
+          </a:stretch>
+        </p:blipFill>
+        <p:spPr>
+          <a:xfrm>
+            <a:off x="862374" y="1434732"/>
+            <a:ext cx="5486690" cy="3657793"/>
+          </a:xfrm>
+          <a:prstGeom prst="rect">
+            <a:avLst/>
+          </a:prstGeom>
+        </p:spPr>
+      </p:pic>
+      <p:pic>
+        <p:nvPicPr>
+          <p:cNvPr id="7" name="Picture 6" descr="A screenshot of a cell phone&#10;&#10;Description automatically generated">
+            <a:extLst>
+              <a:ext uri="{FF2B5EF4-FFF2-40B4-BE49-F238E27FC236}">
+                <a16:creationId xmlns:a16="http://schemas.microsoft.com/office/drawing/2014/main" id="{EC00D830-0B98-4B71-9304-121096856589}"/>
+              </a:ext>
+            </a:extLst>
+          </p:cNvPr>
+          <p:cNvPicPr>
+            <a:picLocks noChangeAspect="1"/>
+          </p:cNvPicPr>
+          <p:nvPr/>
+        </p:nvPicPr>
+        <p:blipFill>
+          <a:blip r:embed="rId3">
+            <a:extLst>
+              <a:ext uri="{28A0092B-C50C-407E-A947-70E740481C1C}">
+                <a14:useLocalDpi xmlns:a14="http://schemas.microsoft.com/office/drawing/2010/main" val="0"/>
+              </a:ext>
+            </a:extLst>
+          </a:blip>
+          <a:stretch>
+            <a:fillRect/>
+          </a:stretch>
+        </p:blipFill>
+        <p:spPr>
+          <a:xfrm>
+            <a:off x="5842936" y="1434731"/>
+            <a:ext cx="5486690" cy="3657793"/>
+          </a:xfrm>
+          <a:prstGeom prst="rect">
+            <a:avLst/>
+          </a:prstGeom>
+        </p:spPr>
+      </p:pic>
+    </p:spTree>
+    <p:extLst>
+      <p:ext uri="{BB962C8B-B14F-4D97-AF65-F5344CB8AC3E}">
+        <p14:creationId xmlns:p14="http://schemas.microsoft.com/office/powerpoint/2010/main" val="3975748203"/>
       </p:ext>
     </p:extLst>
   </p:cSld>

</xml_diff>